<commit_message>
vBeta1.02 ready for release
</commit_message>
<xml_diff>
--- a/Docs/Change log.pptx
+++ b/Docs/Change log.pptx
@@ -5,11 +5,12 @@
     <p:sldMasterId id="2147483648" r:id="rId1"/>
   </p:sldMasterIdLst>
   <p:notesMasterIdLst>
-    <p:notesMasterId r:id="rId4"/>
+    <p:notesMasterId r:id="rId5"/>
   </p:notesMasterIdLst>
   <p:sldIdLst>
     <p:sldId id="259" r:id="rId2"/>
-    <p:sldId id="260" r:id="rId3"/>
+    <p:sldId id="261" r:id="rId3"/>
+    <p:sldId id="260" r:id="rId4"/>
   </p:sldIdLst>
   <p:sldSz cx="12192000" cy="6858000"/>
   <p:notesSz cx="6858000" cy="9144000"/>
@@ -108,6 +109,11 @@
       </a:defRPr>
     </a:lvl9pPr>
   </p:defaultTextStyle>
+  <p:extLst>
+    <p:ext uri="{EFAFB233-063F-42B5-8137-9DF3F51BA10A}">
+      <p15:sldGuideLst xmlns:p15="http://schemas.microsoft.com/office/powerpoint/2012/main"/>
+    </p:ext>
+  </p:extLst>
 </p:presentation>
 </file>
 
@@ -193,7 +199,7 @@
           <a:p>
             <a:fld id="{2801BBA1-81E7-9743-9C81-691DE62F1FC3}" type="datetimeFigureOut">
               <a:rPr lang="en-US" smtClean="0"/>
-              <a:t>4/23/24</a:t>
+              <a:t>4/29/24</a:t>
             </a:fld>
             <a:endParaRPr lang="en-US"/>
           </a:p>
@@ -619,6 +625,90 @@
     </p:spTree>
     <p:extLst>
       <p:ext uri="{BB962C8B-B14F-4D97-AF65-F5344CB8AC3E}">
+        <p14:creationId xmlns:p14="http://schemas.microsoft.com/office/powerpoint/2010/main" val="2403156489"/>
+      </p:ext>
+    </p:extLst>
+  </p:cSld>
+  <p:clrMapOvr>
+    <a:masterClrMapping/>
+  </p:clrMapOvr>
+</p:notes>
+</file>
+
+<file path=ppt/notesSlides/notesSlide3.xml><?xml version="1.0" encoding="utf-8"?>
+<p:notes xmlns:a="http://schemas.openxmlformats.org/drawingml/2006/main" xmlns:r="http://schemas.openxmlformats.org/officeDocument/2006/relationships" xmlns:p="http://schemas.openxmlformats.org/presentationml/2006/main">
+  <p:cSld>
+    <p:spTree>
+      <p:nvGrpSpPr>
+        <p:cNvPr id="1" name=""/>
+        <p:cNvGrpSpPr/>
+        <p:nvPr/>
+      </p:nvGrpSpPr>
+      <p:grpSpPr>
+        <a:xfrm>
+          <a:off x="0" y="0"/>
+          <a:ext cx="0" cy="0"/>
+          <a:chOff x="0" y="0"/>
+          <a:chExt cx="0" cy="0"/>
+        </a:xfrm>
+      </p:grpSpPr>
+      <p:sp>
+        <p:nvSpPr>
+          <p:cNvPr id="2" name="Slide Image Placeholder 1"/>
+          <p:cNvSpPr>
+            <a:spLocks noGrp="1" noRot="1" noChangeAspect="1"/>
+          </p:cNvSpPr>
+          <p:nvPr>
+            <p:ph type="sldImg"/>
+          </p:nvPr>
+        </p:nvSpPr>
+        <p:spPr/>
+      </p:sp>
+      <p:sp>
+        <p:nvSpPr>
+          <p:cNvPr id="3" name="Notes Placeholder 2"/>
+          <p:cNvSpPr>
+            <a:spLocks noGrp="1"/>
+          </p:cNvSpPr>
+          <p:nvPr>
+            <p:ph type="body" idx="1"/>
+          </p:nvPr>
+        </p:nvSpPr>
+        <p:spPr/>
+        <p:txBody>
+          <a:bodyPr/>
+          <a:lstStyle/>
+          <a:p>
+            <a:endParaRPr lang="en-US" dirty="0"/>
+          </a:p>
+        </p:txBody>
+      </p:sp>
+      <p:sp>
+        <p:nvSpPr>
+          <p:cNvPr id="4" name="Slide Number Placeholder 3"/>
+          <p:cNvSpPr>
+            <a:spLocks noGrp="1"/>
+          </p:cNvSpPr>
+          <p:nvPr>
+            <p:ph type="sldNum" sz="quarter" idx="5"/>
+          </p:nvPr>
+        </p:nvSpPr>
+        <p:spPr/>
+        <p:txBody>
+          <a:bodyPr/>
+          <a:lstStyle/>
+          <a:p>
+            <a:fld id="{9C83FBEA-23D8-1346-A296-B1B2EBDD68BC}" type="slidenum">
+              <a:rPr lang="en-US" smtClean="0"/>
+              <a:t>3</a:t>
+            </a:fld>
+            <a:endParaRPr lang="en-US"/>
+          </a:p>
+        </p:txBody>
+      </p:sp>
+    </p:spTree>
+    <p:extLst>
+      <p:ext uri="{BB962C8B-B14F-4D97-AF65-F5344CB8AC3E}">
         <p14:creationId xmlns:p14="http://schemas.microsoft.com/office/powerpoint/2010/main" val="1114036029"/>
       </p:ext>
     </p:extLst>
@@ -778,7 +868,7 @@
           <a:p>
             <a:fld id="{091C22DD-A3BF-114C-B66D-4BAD8A2A9DAD}" type="datetimeFigureOut">
               <a:rPr lang="en-US" smtClean="0"/>
-              <a:t>4/23/24</a:t>
+              <a:t>4/29/24</a:t>
             </a:fld>
             <a:endParaRPr lang="en-US"/>
           </a:p>
@@ -978,7 +1068,7 @@
           <a:p>
             <a:fld id="{091C22DD-A3BF-114C-B66D-4BAD8A2A9DAD}" type="datetimeFigureOut">
               <a:rPr lang="en-US" smtClean="0"/>
-              <a:t>4/23/24</a:t>
+              <a:t>4/29/24</a:t>
             </a:fld>
             <a:endParaRPr lang="en-US"/>
           </a:p>
@@ -1188,7 +1278,7 @@
           <a:p>
             <a:fld id="{091C22DD-A3BF-114C-B66D-4BAD8A2A9DAD}" type="datetimeFigureOut">
               <a:rPr lang="en-US" smtClean="0"/>
-              <a:t>4/23/24</a:t>
+              <a:t>4/29/24</a:t>
             </a:fld>
             <a:endParaRPr lang="en-US"/>
           </a:p>
@@ -1388,7 +1478,7 @@
           <a:p>
             <a:fld id="{091C22DD-A3BF-114C-B66D-4BAD8A2A9DAD}" type="datetimeFigureOut">
               <a:rPr lang="en-US" smtClean="0"/>
-              <a:t>4/23/24</a:t>
+              <a:t>4/29/24</a:t>
             </a:fld>
             <a:endParaRPr lang="en-US"/>
           </a:p>
@@ -1664,7 +1754,7 @@
           <a:p>
             <a:fld id="{091C22DD-A3BF-114C-B66D-4BAD8A2A9DAD}" type="datetimeFigureOut">
               <a:rPr lang="en-US" smtClean="0"/>
-              <a:t>4/23/24</a:t>
+              <a:t>4/29/24</a:t>
             </a:fld>
             <a:endParaRPr lang="en-US"/>
           </a:p>
@@ -1932,7 +2022,7 @@
           <a:p>
             <a:fld id="{091C22DD-A3BF-114C-B66D-4BAD8A2A9DAD}" type="datetimeFigureOut">
               <a:rPr lang="en-US" smtClean="0"/>
-              <a:t>4/23/24</a:t>
+              <a:t>4/29/24</a:t>
             </a:fld>
             <a:endParaRPr lang="en-US"/>
           </a:p>
@@ -2347,7 +2437,7 @@
           <a:p>
             <a:fld id="{091C22DD-A3BF-114C-B66D-4BAD8A2A9DAD}" type="datetimeFigureOut">
               <a:rPr lang="en-US" smtClean="0"/>
-              <a:t>4/23/24</a:t>
+              <a:t>4/29/24</a:t>
             </a:fld>
             <a:endParaRPr lang="en-US"/>
           </a:p>
@@ -2489,7 +2579,7 @@
           <a:p>
             <a:fld id="{091C22DD-A3BF-114C-B66D-4BAD8A2A9DAD}" type="datetimeFigureOut">
               <a:rPr lang="en-US" smtClean="0"/>
-              <a:t>4/23/24</a:t>
+              <a:t>4/29/24</a:t>
             </a:fld>
             <a:endParaRPr lang="en-US"/>
           </a:p>
@@ -2602,7 +2692,7 @@
           <a:p>
             <a:fld id="{091C22DD-A3BF-114C-B66D-4BAD8A2A9DAD}" type="datetimeFigureOut">
               <a:rPr lang="en-US" smtClean="0"/>
-              <a:t>4/23/24</a:t>
+              <a:t>4/29/24</a:t>
             </a:fld>
             <a:endParaRPr lang="en-US"/>
           </a:p>
@@ -2915,7 +3005,7 @@
           <a:p>
             <a:fld id="{091C22DD-A3BF-114C-B66D-4BAD8A2A9DAD}" type="datetimeFigureOut">
               <a:rPr lang="en-US" smtClean="0"/>
-              <a:t>4/23/24</a:t>
+              <a:t>4/29/24</a:t>
             </a:fld>
             <a:endParaRPr lang="en-US"/>
           </a:p>
@@ -3204,7 +3294,7 @@
           <a:p>
             <a:fld id="{091C22DD-A3BF-114C-B66D-4BAD8A2A9DAD}" type="datetimeFigureOut">
               <a:rPr lang="en-US" smtClean="0"/>
-              <a:t>4/23/24</a:t>
+              <a:t>4/29/24</a:t>
             </a:fld>
             <a:endParaRPr lang="en-US"/>
           </a:p>
@@ -3447,7 +3537,7 @@
           <a:p>
             <a:fld id="{091C22DD-A3BF-114C-B66D-4BAD8A2A9DAD}" type="datetimeFigureOut">
               <a:rPr lang="en-US" smtClean="0"/>
-              <a:t>4/23/24</a:t>
+              <a:t>4/29/24</a:t>
             </a:fld>
             <a:endParaRPr lang="en-US"/>
           </a:p>
@@ -3971,7 +4061,7 @@
                   </a:schemeClr>
                 </a:solidFill>
               </a:rPr>
-              <a:t>Change Log – vBeta1.01</a:t>
+              <a:t>Change Log – vBeta1.02</a:t>
             </a:r>
           </a:p>
           <a:p>
@@ -4213,7 +4303,7 @@
                   <a:schemeClr val="bg1"/>
                 </a:solidFill>
               </a:rPr>
-              <a:t>Change Log vBeta1.01</a:t>
+              <a:t>Change Log vBeta1.02</a:t>
             </a:r>
           </a:p>
         </p:txBody>
@@ -4333,7 +4423,7 @@
         </p:nvSpPr>
         <p:spPr>
           <a:xfrm>
-            <a:off x="387514" y="1481851"/>
+            <a:off x="310324" y="928867"/>
             <a:ext cx="8368178" cy="1877437"/>
           </a:xfrm>
           <a:prstGeom prst="rect">
@@ -4355,7 +4445,7 @@
                   </a:schemeClr>
                 </a:solidFill>
               </a:rPr>
-              <a:t>vBeta1.01 – 23</a:t>
+              <a:t>vBeta1.02 – 29</a:t>
             </a:r>
             <a:r>
               <a:rPr lang="en-US" baseline="30000" dirty="0">
@@ -4365,7 +4455,7 @@
                   </a:schemeClr>
                 </a:solidFill>
               </a:rPr>
-              <a:t>rd</a:t>
+              <a:t>th</a:t>
             </a:r>
             <a:r>
               <a:rPr lang="en-US" dirty="0">
@@ -4396,18 +4486,10 @@
                   </a:schemeClr>
                 </a:solidFill>
               </a:rPr>
-              <a:t>Corrected command typo in installation document (</a:t>
-            </a:r>
-            <a:r>
-              <a:rPr lang="en-US" sz="1400" dirty="0" err="1">
-                <a:solidFill>
-                  <a:schemeClr val="accent1">
-                    <a:lumMod val="50000"/>
-                  </a:schemeClr>
-                </a:solidFill>
-              </a:rPr>
-              <a:t>xattr</a:t>
-            </a:r>
+              <a:t>Added instructions to the installation document for upgrading the plugin</a:t>
+            </a:r>
+          </a:p>
+          <a:p>
             <a:r>
               <a:rPr lang="en-US" sz="1400" dirty="0">
                 <a:solidFill>
@@ -4416,7 +4498,7 @@
                   </a:schemeClr>
                 </a:solidFill>
               </a:rPr>
-              <a:t> command)</a:t>
+              <a:t>Additional guidance on base config included in the installation document</a:t>
             </a:r>
           </a:p>
           <a:p>
@@ -4428,7 +4510,7 @@
                   </a:schemeClr>
                 </a:solidFill>
               </a:rPr>
-              <a:t>Added autopilot light configs to default config for Beechcraft Baron 58</a:t>
+              <a:t>Beechcraft 58 – moved pilot QNH setting to be default ALT rotary command, copilot QNH moved to Toggle6 Cirrus SR22 – default config for Toggle6 and Toggle 5 realigned</a:t>
             </a:r>
           </a:p>
           <a:p>
@@ -4440,29 +4522,8 @@
                   </a:schemeClr>
                 </a:solidFill>
               </a:rPr>
-              <a:t>Corrected documentation error in Default Config table for Beechcraft Baron 58 (OBS HSI in wrong box)</a:t>
-            </a:r>
-          </a:p>
-          <a:p>
-            <a:r>
-              <a:rPr lang="en-US" sz="1400" dirty="0">
-                <a:solidFill>
-                  <a:schemeClr val="accent1">
-                    <a:lumMod val="50000"/>
-                  </a:schemeClr>
-                </a:solidFill>
-              </a:rPr>
-              <a:t>Added commands for adjusting ADF dial  in default config for Beechcraft Baron 58</a:t>
-            </a:r>
-          </a:p>
-          <a:p>
-            <a:endParaRPr lang="en-US" sz="1400" dirty="0">
-              <a:solidFill>
-                <a:schemeClr val="accent1">
-                  <a:lumMod val="50000"/>
-                </a:schemeClr>
-              </a:solidFill>
-            </a:endParaRPr>
+              <a:t>Added autopilot button lights for ALIA250</a:t>
+            </a:r>
           </a:p>
           <a:p>
             <a:endParaRPr lang="en-US" sz="1400" dirty="0">
@@ -4573,7 +4634,367 @@
                   <a:schemeClr val="bg1"/>
                 </a:solidFill>
               </a:rPr>
-              <a:t>Change Log vBeta1.01</a:t>
+              <a:t>Change Log vBeta1.02</a:t>
+            </a:r>
+          </a:p>
+        </p:txBody>
+      </p:sp>
+    </p:spTree>
+    <p:extLst>
+      <p:ext uri="{BB962C8B-B14F-4D97-AF65-F5344CB8AC3E}">
+        <p14:creationId xmlns:p14="http://schemas.microsoft.com/office/powerpoint/2010/main" val="4014724599"/>
+      </p:ext>
+    </p:extLst>
+  </p:cSld>
+  <p:clrMapOvr>
+    <a:masterClrMapping/>
+  </p:clrMapOvr>
+</p:sld>
+</file>
+
+<file path=ppt/slides/slide3.xml><?xml version="1.0" encoding="utf-8"?>
+<p:sld xmlns:a="http://schemas.openxmlformats.org/drawingml/2006/main" xmlns:r="http://schemas.openxmlformats.org/officeDocument/2006/relationships" xmlns:p="http://schemas.openxmlformats.org/presentationml/2006/main">
+  <p:cSld>
+    <p:spTree>
+      <p:nvGrpSpPr>
+        <p:cNvPr id="1" name=""/>
+        <p:cNvGrpSpPr/>
+        <p:nvPr/>
+      </p:nvGrpSpPr>
+      <p:grpSpPr>
+        <a:xfrm>
+          <a:off x="0" y="0"/>
+          <a:ext cx="0" cy="0"/>
+          <a:chOff x="0" y="0"/>
+          <a:chExt cx="0" cy="0"/>
+        </a:xfrm>
+      </p:grpSpPr>
+      <p:pic>
+        <p:nvPicPr>
+          <p:cNvPr id="5" name="Picture 4" descr="A plane flying over mountains&#10;&#10;Description automatically generated">
+            <a:extLst>
+              <a:ext uri="{FF2B5EF4-FFF2-40B4-BE49-F238E27FC236}">
+                <a16:creationId xmlns:a16="http://schemas.microsoft.com/office/drawing/2014/main" id="{6685476C-1E9B-BC7B-4872-019733F3D240}"/>
+              </a:ext>
+            </a:extLst>
+          </p:cNvPr>
+          <p:cNvPicPr preferRelativeResize="0">
+            <a:picLocks/>
+          </p:cNvPicPr>
+          <p:nvPr/>
+        </p:nvPicPr>
+        <p:blipFill>
+          <a:blip r:embed="rId3"/>
+          <a:stretch>
+            <a:fillRect/>
+          </a:stretch>
+        </p:blipFill>
+        <p:spPr>
+          <a:xfrm>
+            <a:off x="0" y="0"/>
+            <a:ext cx="12192000" cy="6858000"/>
+          </a:xfrm>
+          <a:prstGeom prst="rect">
+            <a:avLst/>
+          </a:prstGeom>
+        </p:spPr>
+      </p:pic>
+      <p:sp>
+        <p:nvSpPr>
+          <p:cNvPr id="10" name="TextBox 9">
+            <a:extLst>
+              <a:ext uri="{FF2B5EF4-FFF2-40B4-BE49-F238E27FC236}">
+                <a16:creationId xmlns:a16="http://schemas.microsoft.com/office/drawing/2014/main" id="{4F8795F4-26DD-59AD-2FED-C8F1F47A6323}"/>
+              </a:ext>
+            </a:extLst>
+          </p:cNvPr>
+          <p:cNvSpPr txBox="1"/>
+          <p:nvPr/>
+        </p:nvSpPr>
+        <p:spPr>
+          <a:xfrm>
+            <a:off x="8263582" y="262714"/>
+            <a:ext cx="3413411" cy="369332"/>
+          </a:xfrm>
+          <a:prstGeom prst="rect">
+            <a:avLst/>
+          </a:prstGeom>
+          <a:noFill/>
+        </p:spPr>
+        <p:txBody>
+          <a:bodyPr wrap="square">
+            <a:spAutoFit/>
+          </a:bodyPr>
+          <a:lstStyle/>
+          <a:p>
+            <a:r>
+              <a:rPr lang="en-GB" dirty="0">
+                <a:solidFill>
+                  <a:srgbClr val="C41A16"/>
+                </a:solidFill>
+                <a:effectLst/>
+                <a:latin typeface="Menlo" panose="020B0609030804020204" pitchFamily="49" charset="0"/>
+              </a:rPr>
+              <a:t>HoneycombOnArm64MacOS</a:t>
+            </a:r>
+          </a:p>
+        </p:txBody>
+      </p:sp>
+      <p:sp>
+        <p:nvSpPr>
+          <p:cNvPr id="2" name="TextBox 1">
+            <a:extLst>
+              <a:ext uri="{FF2B5EF4-FFF2-40B4-BE49-F238E27FC236}">
+                <a16:creationId xmlns:a16="http://schemas.microsoft.com/office/drawing/2014/main" id="{97AEBE6B-2D39-4939-B794-F6D620D619FD}"/>
+              </a:ext>
+            </a:extLst>
+          </p:cNvPr>
+          <p:cNvSpPr txBox="1"/>
+          <p:nvPr/>
+        </p:nvSpPr>
+        <p:spPr>
+          <a:xfrm>
+            <a:off x="387514" y="1481851"/>
+            <a:ext cx="8368178" cy="1877437"/>
+          </a:xfrm>
+          <a:prstGeom prst="rect">
+            <a:avLst/>
+          </a:prstGeom>
+          <a:noFill/>
+        </p:spPr>
+        <p:txBody>
+          <a:bodyPr wrap="square" rtlCol="0">
+            <a:spAutoFit/>
+          </a:bodyPr>
+          <a:lstStyle/>
+          <a:p>
+            <a:r>
+              <a:rPr lang="en-US" dirty="0">
+                <a:solidFill>
+                  <a:schemeClr val="accent1">
+                    <a:lumMod val="50000"/>
+                  </a:schemeClr>
+                </a:solidFill>
+              </a:rPr>
+              <a:t>vBeta1.01 – 23</a:t>
+            </a:r>
+            <a:r>
+              <a:rPr lang="en-US" baseline="30000" dirty="0">
+                <a:solidFill>
+                  <a:schemeClr val="accent1">
+                    <a:lumMod val="50000"/>
+                  </a:schemeClr>
+                </a:solidFill>
+              </a:rPr>
+              <a:t>rd</a:t>
+            </a:r>
+            <a:r>
+              <a:rPr lang="en-US" dirty="0">
+                <a:solidFill>
+                  <a:schemeClr val="accent1">
+                    <a:lumMod val="50000"/>
+                  </a:schemeClr>
+                </a:solidFill>
+              </a:rPr>
+              <a:t> April 2024</a:t>
+            </a:r>
+          </a:p>
+          <a:p>
+            <a:endParaRPr lang="en-US" sz="1400" dirty="0">
+              <a:solidFill>
+                <a:schemeClr val="accent1">
+                  <a:lumMod val="50000"/>
+                </a:schemeClr>
+              </a:solidFill>
+            </a:endParaRPr>
+          </a:p>
+          <a:p>
+            <a:r>
+              <a:rPr lang="en-US" sz="1400" dirty="0">
+                <a:solidFill>
+                  <a:schemeClr val="accent1">
+                    <a:lumMod val="50000"/>
+                  </a:schemeClr>
+                </a:solidFill>
+              </a:rPr>
+              <a:t>Corrected command typo in installation document (</a:t>
+            </a:r>
+            <a:r>
+              <a:rPr lang="en-US" sz="1400" dirty="0" err="1">
+                <a:solidFill>
+                  <a:schemeClr val="accent1">
+                    <a:lumMod val="50000"/>
+                  </a:schemeClr>
+                </a:solidFill>
+              </a:rPr>
+              <a:t>xattr</a:t>
+            </a:r>
+            <a:r>
+              <a:rPr lang="en-US" sz="1400" dirty="0">
+                <a:solidFill>
+                  <a:schemeClr val="accent1">
+                    <a:lumMod val="50000"/>
+                  </a:schemeClr>
+                </a:solidFill>
+              </a:rPr>
+              <a:t> command)</a:t>
+            </a:r>
+          </a:p>
+          <a:p>
+            <a:r>
+              <a:rPr lang="en-US" sz="1400" dirty="0">
+                <a:solidFill>
+                  <a:schemeClr val="accent1">
+                    <a:lumMod val="50000"/>
+                  </a:schemeClr>
+                </a:solidFill>
+              </a:rPr>
+              <a:t>Added autopilot light configs to default config for Beechcraft Baron 58</a:t>
+            </a:r>
+          </a:p>
+          <a:p>
+            <a:r>
+              <a:rPr lang="en-US" sz="1400" dirty="0">
+                <a:solidFill>
+                  <a:schemeClr val="accent1">
+                    <a:lumMod val="50000"/>
+                  </a:schemeClr>
+                </a:solidFill>
+              </a:rPr>
+              <a:t>Corrected documentation error in Default Config table for Beechcraft Baron 58 (OBS HSI in wrong box)</a:t>
+            </a:r>
+          </a:p>
+          <a:p>
+            <a:r>
+              <a:rPr lang="en-US" sz="1400" dirty="0">
+                <a:solidFill>
+                  <a:schemeClr val="accent1">
+                    <a:lumMod val="50000"/>
+                  </a:schemeClr>
+                </a:solidFill>
+              </a:rPr>
+              <a:t>Added commands for adjusting ADF dial  in default config for Beechcraft Baron 58</a:t>
+            </a:r>
+          </a:p>
+          <a:p>
+            <a:endParaRPr lang="en-US" sz="1400" dirty="0">
+              <a:solidFill>
+                <a:schemeClr val="accent1">
+                  <a:lumMod val="50000"/>
+                </a:schemeClr>
+              </a:solidFill>
+            </a:endParaRPr>
+          </a:p>
+          <a:p>
+            <a:endParaRPr lang="en-US" sz="1400" dirty="0">
+              <a:solidFill>
+                <a:schemeClr val="accent1">
+                  <a:lumMod val="50000"/>
+                </a:schemeClr>
+              </a:solidFill>
+            </a:endParaRPr>
+          </a:p>
+        </p:txBody>
+      </p:sp>
+      <p:sp>
+        <p:nvSpPr>
+          <p:cNvPr id="4" name="TextBox 3">
+            <a:extLst>
+              <a:ext uri="{FF2B5EF4-FFF2-40B4-BE49-F238E27FC236}">
+                <a16:creationId xmlns:a16="http://schemas.microsoft.com/office/drawing/2014/main" id="{B253DD70-D7C4-4FE8-F0FE-7F13043DAE24}"/>
+              </a:ext>
+            </a:extLst>
+          </p:cNvPr>
+          <p:cNvSpPr txBox="1"/>
+          <p:nvPr/>
+        </p:nvSpPr>
+        <p:spPr>
+          <a:xfrm>
+            <a:off x="175775" y="6364454"/>
+            <a:ext cx="1305443" cy="338554"/>
+          </a:xfrm>
+          <a:prstGeom prst="rect">
+            <a:avLst/>
+          </a:prstGeom>
+          <a:noFill/>
+        </p:spPr>
+        <p:txBody>
+          <a:bodyPr wrap="square">
+            <a:spAutoFit/>
+          </a:bodyPr>
+          <a:lstStyle/>
+          <a:p>
+            <a:pPr algn="ctr"/>
+            <a:r>
+              <a:rPr lang="en-US" sz="800" dirty="0">
+                <a:solidFill>
+                  <a:schemeClr val="bg1"/>
+                </a:solidFill>
+              </a:rPr>
+              <a:t>© Dr Steve Proctor 2024  </a:t>
+            </a:r>
+          </a:p>
+          <a:p>
+            <a:pPr algn="ctr"/>
+            <a:r>
+              <a:rPr lang="en-US" sz="800" dirty="0">
+                <a:solidFill>
+                  <a:schemeClr val="bg1"/>
+                </a:solidFill>
+                <a:hlinkClick r:id="rId4">
+                  <a:extLst>
+                    <a:ext uri="{A12FA001-AC4F-418D-AE19-62706E023703}">
+                      <ahyp:hlinkClr xmlns:ahyp="http://schemas.microsoft.com/office/drawing/2018/hyperlinkcolor" val="tx"/>
+                    </a:ext>
+                  </a:extLst>
+                </a:hlinkClick>
+              </a:rPr>
+              <a:t>swp336@gmail.com</a:t>
+            </a:r>
+            <a:endParaRPr lang="en-US" sz="800" dirty="0">
+              <a:solidFill>
+                <a:schemeClr val="bg1"/>
+              </a:solidFill>
+            </a:endParaRPr>
+          </a:p>
+        </p:txBody>
+      </p:sp>
+      <p:sp>
+        <p:nvSpPr>
+          <p:cNvPr id="7" name="TextBox 6">
+            <a:extLst>
+              <a:ext uri="{FF2B5EF4-FFF2-40B4-BE49-F238E27FC236}">
+                <a16:creationId xmlns:a16="http://schemas.microsoft.com/office/drawing/2014/main" id="{3AA892B3-B20D-CD59-A1E8-7D8039A26D7D}"/>
+              </a:ext>
+            </a:extLst>
+          </p:cNvPr>
+          <p:cNvSpPr txBox="1"/>
+          <p:nvPr/>
+        </p:nvSpPr>
+        <p:spPr>
+          <a:xfrm>
+            <a:off x="10619382" y="6487564"/>
+            <a:ext cx="1391233" cy="215444"/>
+          </a:xfrm>
+          <a:prstGeom prst="rect">
+            <a:avLst/>
+          </a:prstGeom>
+          <a:noFill/>
+        </p:spPr>
+        <p:txBody>
+          <a:bodyPr wrap="square" rtlCol="0">
+            <a:spAutoFit/>
+          </a:bodyPr>
+          <a:lstStyle/>
+          <a:p>
+            <a:pPr algn="ctr"/>
+            <a:r>
+              <a:rPr lang="en-US" sz="800" dirty="0">
+                <a:solidFill>
+                  <a:schemeClr val="bg1"/>
+                </a:solidFill>
+              </a:rPr>
+              <a:t>Change Log vBeta1.02</a:t>
             </a:r>
           </a:p>
         </p:txBody>

</xml_diff>